<commit_message>
chnaged name of trash to solutions
</commit_message>
<xml_diff>
--- a/jsjq.pptx
+++ b/jsjq.pptx
@@ -217,7 +217,7 @@
           <a:p>
             <a:fld id="{9397DA40-518A-9748-AF73-2411146BFD4E}" type="datetimeFigureOut">
               <a:rPr lang="en-US" smtClean="0"/>
-              <a:t>10/22/14</a:t>
+              <a:t>10/25/14</a:t>
             </a:fld>
             <a:endParaRPr lang="en-US"/>
           </a:p>
@@ -1342,7 +1342,7 @@
           <a:p>
             <a:fld id="{FFC5A8F0-F374-C74C-BFFA-72F8BA86FEF6}" type="datetimeFigureOut">
               <a:rPr lang="en-US" smtClean="0"/>
-              <a:t>10/22/14</a:t>
+              <a:t>10/25/14</a:t>
             </a:fld>
             <a:endParaRPr lang="en-US"/>
           </a:p>
@@ -1512,7 +1512,7 @@
           <a:p>
             <a:fld id="{FFC5A8F0-F374-C74C-BFFA-72F8BA86FEF6}" type="datetimeFigureOut">
               <a:rPr lang="en-US" smtClean="0"/>
-              <a:t>10/22/14</a:t>
+              <a:t>10/25/14</a:t>
             </a:fld>
             <a:endParaRPr lang="en-US"/>
           </a:p>
@@ -1692,7 +1692,7 @@
           <a:p>
             <a:fld id="{FFC5A8F0-F374-C74C-BFFA-72F8BA86FEF6}" type="datetimeFigureOut">
               <a:rPr lang="en-US" smtClean="0"/>
-              <a:t>10/22/14</a:t>
+              <a:t>10/25/14</a:t>
             </a:fld>
             <a:endParaRPr lang="en-US"/>
           </a:p>
@@ -1862,7 +1862,7 @@
           <a:p>
             <a:fld id="{FFC5A8F0-F374-C74C-BFFA-72F8BA86FEF6}" type="datetimeFigureOut">
               <a:rPr lang="en-US" smtClean="0"/>
-              <a:t>10/22/14</a:t>
+              <a:t>10/25/14</a:t>
             </a:fld>
             <a:endParaRPr lang="en-US"/>
           </a:p>
@@ -2108,7 +2108,7 @@
           <a:p>
             <a:fld id="{FFC5A8F0-F374-C74C-BFFA-72F8BA86FEF6}" type="datetimeFigureOut">
               <a:rPr lang="en-US" smtClean="0"/>
-              <a:t>10/22/14</a:t>
+              <a:t>10/25/14</a:t>
             </a:fld>
             <a:endParaRPr lang="en-US"/>
           </a:p>
@@ -2396,7 +2396,7 @@
           <a:p>
             <a:fld id="{FFC5A8F0-F374-C74C-BFFA-72F8BA86FEF6}" type="datetimeFigureOut">
               <a:rPr lang="en-US" smtClean="0"/>
-              <a:t>10/22/14</a:t>
+              <a:t>10/25/14</a:t>
             </a:fld>
             <a:endParaRPr lang="en-US"/>
           </a:p>
@@ -2818,7 +2818,7 @@
           <a:p>
             <a:fld id="{FFC5A8F0-F374-C74C-BFFA-72F8BA86FEF6}" type="datetimeFigureOut">
               <a:rPr lang="en-US" smtClean="0"/>
-              <a:t>10/22/14</a:t>
+              <a:t>10/25/14</a:t>
             </a:fld>
             <a:endParaRPr lang="en-US"/>
           </a:p>
@@ -2936,7 +2936,7 @@
           <a:p>
             <a:fld id="{FFC5A8F0-F374-C74C-BFFA-72F8BA86FEF6}" type="datetimeFigureOut">
               <a:rPr lang="en-US" smtClean="0"/>
-              <a:t>10/22/14</a:t>
+              <a:t>10/25/14</a:t>
             </a:fld>
             <a:endParaRPr lang="en-US"/>
           </a:p>
@@ -3031,7 +3031,7 @@
           <a:p>
             <a:fld id="{FFC5A8F0-F374-C74C-BFFA-72F8BA86FEF6}" type="datetimeFigureOut">
               <a:rPr lang="en-US" smtClean="0"/>
-              <a:t>10/22/14</a:t>
+              <a:t>10/25/14</a:t>
             </a:fld>
             <a:endParaRPr lang="en-US"/>
           </a:p>
@@ -3308,7 +3308,7 @@
           <a:p>
             <a:fld id="{FFC5A8F0-F374-C74C-BFFA-72F8BA86FEF6}" type="datetimeFigureOut">
               <a:rPr lang="en-US" smtClean="0"/>
-              <a:t>10/22/14</a:t>
+              <a:t>10/25/14</a:t>
             </a:fld>
             <a:endParaRPr lang="en-US"/>
           </a:p>
@@ -3561,7 +3561,7 @@
           <a:p>
             <a:fld id="{FFC5A8F0-F374-C74C-BFFA-72F8BA86FEF6}" type="datetimeFigureOut">
               <a:rPr lang="en-US" smtClean="0"/>
-              <a:t>10/22/14</a:t>
+              <a:t>10/25/14</a:t>
             </a:fld>
             <a:endParaRPr lang="en-US"/>
           </a:p>
@@ -3774,7 +3774,7 @@
           <a:p>
             <a:fld id="{FFC5A8F0-F374-C74C-BFFA-72F8BA86FEF6}" type="datetimeFigureOut">
               <a:rPr lang="en-US" smtClean="0"/>
-              <a:t>10/22/14</a:t>
+              <a:t>10/25/14</a:t>
             </a:fld>
             <a:endParaRPr lang="en-US"/>
           </a:p>
@@ -4199,13 +4199,8 @@
           <a:p>
             <a:r>
               <a:rPr lang="en-US" dirty="0" smtClean="0"/>
-              <a:t>October </a:t>
-            </a:r>
-            <a:r>
-              <a:rPr lang="en-US" dirty="0" smtClean="0"/>
-              <a:t>25		WEH 5403</a:t>
-            </a:r>
-            <a:endParaRPr lang="en-US" dirty="0" smtClean="0"/>
+              <a:t>October 25		WEH 5403</a:t>
+            </a:r>
           </a:p>
           <a:p>
             <a:r>
@@ -4895,14 +4890,7 @@
                 <a:latin typeface="+mj-lt"/>
                 <a:cs typeface="Courier"/>
               </a:rPr>
-              <a:t> within their parents </a:t>
-            </a:r>
-            <a:r>
-              <a:rPr lang="en-US" dirty="0" smtClean="0">
-                <a:latin typeface="+mj-lt"/>
-                <a:cs typeface="Courier"/>
-              </a:rPr>
-              <a:t>only</a:t>
+              <a:t> within their parents only</a:t>
             </a:r>
           </a:p>
         </p:txBody>
@@ -5624,15 +5612,7 @@
             </a:pPr>
             <a:r>
               <a:rPr lang="en-US" dirty="0" smtClean="0"/>
-              <a:t>Traversing the DOM (parents</a:t>
-            </a:r>
-            <a:r>
-              <a:rPr lang="en-US" dirty="0" smtClean="0"/>
-              <a:t>/</a:t>
-            </a:r>
-            <a:r>
-              <a:rPr lang="en-US" dirty="0" smtClean="0"/>
-              <a:t>children)</a:t>
+              <a:t>Traversing the DOM (parents/children)</a:t>
             </a:r>
             <a:endParaRPr lang="en-US" dirty="0"/>
           </a:p>
@@ -5943,14 +5923,7 @@
                 <a:latin typeface="Courier"/>
                 <a:cs typeface="Courier"/>
               </a:rPr>
-              <a:t>&lt;</a:t>
-            </a:r>
-            <a:r>
-              <a:rPr lang="en-US" dirty="0" smtClean="0">
-                <a:latin typeface="Courier"/>
-                <a:cs typeface="Courier"/>
-              </a:rPr>
-              <a:t>script type = "text/</a:t>
+              <a:t>&lt;script type = "text/</a:t>
             </a:r>
             <a:r>
               <a:rPr lang="en-US" dirty="0" err="1" smtClean="0">
@@ -6325,7 +6298,7 @@
         </p:spPr>
         <p:txBody>
           <a:bodyPr>
-            <a:normAutofit fontScale="85000" lnSpcReduction="20000"/>
+            <a:normAutofit fontScale="92500" lnSpcReduction="20000"/>
           </a:bodyPr>
           <a:lstStyle/>
           <a:p>
@@ -6382,13 +6355,11 @@
           <a:p>
             <a:r>
               <a:rPr lang="en-US" dirty="0" smtClean="0"/>
-              <a:t>Vim 				WEH 5403</a:t>
-            </a:r>
-          </a:p>
-          <a:p>
-            <a:r>
-              <a:rPr lang="en-US" dirty="0" smtClean="0"/>
-              <a:t>Typography 		WEH 5409</a:t>
+              <a:t>Typography </a:t>
+            </a:r>
+            <a:r>
+              <a:rPr lang="en-US" dirty="0" smtClean="0"/>
+              <a:t>		WEH 5409</a:t>
             </a:r>
           </a:p>
           <a:p>
@@ -6716,11 +6687,7 @@
           <a:p>
             <a:r>
               <a:rPr lang="en-US" dirty="0" smtClean="0"/>
-              <a:t>API </a:t>
-            </a:r>
-            <a:r>
-              <a:rPr lang="en-US" dirty="0" smtClean="0"/>
-              <a:t>requests</a:t>
+              <a:t>API requests</a:t>
             </a:r>
             <a:endParaRPr lang="en-US" dirty="0"/>
           </a:p>
@@ -7150,22 +7117,39 @@
                 <a:latin typeface="Courier"/>
                 <a:cs typeface="Courier"/>
               </a:rPr>
-              <a:t>(callback())</a:t>
-            </a:r>
-            <a:r>
-              <a:rPr lang="en-US" dirty="0" smtClean="0">
-                <a:latin typeface="Courier"/>
-                <a:cs typeface="Courier"/>
-              </a:rPr>
-              <a:t>{</a:t>
-            </a:r>
-          </a:p>
-          <a:p>
-            <a:pPr marL="0" indent="0">
-              <a:buNone/>
-            </a:pPr>
-            <a:r>
-              <a:rPr lang="en-US" dirty="0" smtClean="0">
+              <a:t>(callback()){</a:t>
+            </a:r>
+          </a:p>
+          <a:p>
+            <a:pPr marL="0" indent="0">
+              <a:buNone/>
+            </a:pPr>
+            <a:r>
+              <a:rPr lang="en-US" dirty="0" smtClean="0">
+                <a:latin typeface="Courier"/>
+                <a:cs typeface="Courier"/>
+              </a:rPr>
+              <a:t>	…</a:t>
+            </a:r>
+          </a:p>
+          <a:p>
+            <a:pPr marL="0" indent="0">
+              <a:buNone/>
+            </a:pPr>
+            <a:r>
+              <a:rPr lang="en-US" dirty="0" smtClean="0">
+                <a:latin typeface="Courier"/>
+                <a:cs typeface="Courier"/>
+              </a:rPr>
+              <a:t>	results = […]</a:t>
+            </a:r>
+          </a:p>
+          <a:p>
+            <a:pPr marL="0" indent="0">
+              <a:buNone/>
+            </a:pPr>
+            <a:r>
+              <a:rPr lang="en-US" dirty="0">
                 <a:latin typeface="Courier"/>
                 <a:cs typeface="Courier"/>
               </a:rPr>
@@ -7176,43 +7160,8 @@
                 <a:latin typeface="Courier"/>
                 <a:cs typeface="Courier"/>
               </a:rPr>
-              <a:t>…</a:t>
-            </a:r>
-          </a:p>
-          <a:p>
-            <a:pPr marL="0" indent="0">
-              <a:buNone/>
-            </a:pPr>
-            <a:r>
-              <a:rPr lang="en-US" dirty="0" smtClean="0">
-                <a:latin typeface="Courier"/>
-                <a:cs typeface="Courier"/>
-              </a:rPr>
-              <a:t>	results = […]</a:t>
-            </a:r>
-          </a:p>
-          <a:p>
-            <a:pPr marL="0" indent="0">
-              <a:buNone/>
-            </a:pPr>
-            <a:r>
-              <a:rPr lang="en-US" dirty="0">
-                <a:latin typeface="Courier"/>
-                <a:cs typeface="Courier"/>
-              </a:rPr>
-              <a:t>	</a:t>
-            </a:r>
-            <a:r>
-              <a:rPr lang="en-US" dirty="0" smtClean="0">
-                <a:latin typeface="Courier"/>
-                <a:cs typeface="Courier"/>
-              </a:rPr>
               <a:t>callback(results);</a:t>
             </a:r>
-            <a:endParaRPr lang="en-US" dirty="0" smtClean="0">
-              <a:latin typeface="Courier"/>
-              <a:cs typeface="Courier"/>
-            </a:endParaRPr>
           </a:p>
           <a:p>
             <a:pPr marL="0" indent="0">
@@ -7643,14 +7592,27 @@
         </p:nvSpPr>
         <p:spPr/>
         <p:txBody>
-          <a:bodyPr/>
-          <a:lstStyle/>
-          <a:p>
-            <a:r>
-              <a:rPr lang="en-US" dirty="0" smtClean="0"/>
-              <a:t>Questions?</a:t>
-            </a:r>
-            <a:endParaRPr lang="en-US" dirty="0"/>
+          <a:bodyPr>
+            <a:normAutofit/>
+          </a:bodyPr>
+          <a:lstStyle/>
+          <a:p>
+            <a:r>
+              <a:rPr lang="en-US" dirty="0" smtClean="0"/>
+              <a:t>Questions</a:t>
+            </a:r>
+            <a:r>
+              <a:rPr lang="en-US" dirty="0" smtClean="0"/>
+              <a:t>?</a:t>
+            </a:r>
+            <a:br>
+              <a:rPr lang="en-US" dirty="0" smtClean="0"/>
+            </a:br>
+            <a:r>
+              <a:rPr lang="en-US" sz="3100" dirty="0" smtClean="0"/>
+              <a:t>please fill out the survey when you get it</a:t>
+            </a:r>
+            <a:endParaRPr lang="en-US" sz="3100" dirty="0"/>
           </a:p>
         </p:txBody>
       </p:sp>
@@ -7769,7 +7731,6 @@
               <a:rPr lang="en-US" dirty="0" smtClean="0"/>
               <a:t>JavaScript and HTML</a:t>
             </a:r>
-            <a:endParaRPr lang="en-US" dirty="0" smtClean="0"/>
           </a:p>
           <a:p>
             <a:r>
@@ -7903,11 +7864,7 @@
             </a:pPr>
             <a:r>
               <a:rPr lang="en-US" dirty="0" smtClean="0"/>
-              <a:t>Server</a:t>
-            </a:r>
-            <a:r>
-              <a:rPr lang="en-US" dirty="0" smtClean="0"/>
-              <a:t>-side programming</a:t>
+              <a:t>Server-side programming</a:t>
             </a:r>
           </a:p>
         </p:txBody>
@@ -8376,11 +8333,7 @@
           <a:p>
             <a:r>
               <a:rPr lang="en-US" dirty="0" smtClean="0"/>
-              <a:t>Chrome </a:t>
-            </a:r>
-            <a:r>
-              <a:rPr lang="en-US" dirty="0" smtClean="0"/>
-              <a:t>Exercises</a:t>
+              <a:t>Chrome Exercises</a:t>
             </a:r>
             <a:endParaRPr lang="en-US" dirty="0"/>
           </a:p>

</xml_diff>